<commit_message>
gen data with new format
</commit_message>
<xml_diff>
--- a/yippee.pptx
+++ b/yippee.pptx
@@ -653,15 +653,7 @@
             </a:r>
             <a:r>
               <a:rPr lang="en-SG" dirty="0"/>
-              <a:t> </a:t>
-            </a:r>
-            <a:r>
-              <a:rPr lang="en-SG"/>
-              <a:t>an entity/topic </a:t>
-            </a:r>
-            <a:r>
-              <a:rPr lang="en-SG" dirty="0"/>
-              <a:t>by the looks of it</a:t>
+              <a:t> an entity/topic by the looks of it</a:t>
             </a:r>
           </a:p>
         </p:txBody>
@@ -783,6 +775,12 @@
             <a:r>
               <a:rPr lang="en-SG" dirty="0"/>
               <a:t> an entity by the looks of it</a:t>
+            </a:r>
+          </a:p>
+          <a:p>
+            <a:r>
+              <a:rPr lang="en-SG" dirty="0"/>
+              <a:t>Maybe in order to treat it as an entity, we can have </a:t>
             </a:r>
           </a:p>
         </p:txBody>
@@ -9364,7 +9362,7 @@
         </p:nvSpPr>
         <p:spPr>
           <a:xfrm>
-            <a:off x="4864100" y="2463800"/>
+            <a:off x="4532258" y="2186546"/>
             <a:ext cx="596900" cy="622300"/>
           </a:xfrm>
           <a:prstGeom prst="ellipse">
@@ -9411,14 +9409,14 @@
           <p:cNvCxnSpPr>
             <a:cxnSpLocks/>
             <a:stCxn id="4" idx="4"/>
-            <a:endCxn id="18" idx="0"/>
+            <a:endCxn id="39" idx="0"/>
           </p:cNvCxnSpPr>
           <p:nvPr/>
         </p:nvCxnSpPr>
         <p:spPr>
           <a:xfrm>
             <a:off x="2787650" y="1930400"/>
-            <a:ext cx="459429" cy="1286816"/>
+            <a:ext cx="211036" cy="1084080"/>
           </a:xfrm>
           <a:prstGeom prst="line">
             <a:avLst/>
@@ -9427,13 +9425,13 @@
         </p:spPr>
         <p:style>
           <a:lnRef idx="1">
-            <a:schemeClr val="accent6"/>
+            <a:schemeClr val="accent4"/>
           </a:lnRef>
           <a:fillRef idx="0">
-            <a:schemeClr val="accent6"/>
+            <a:schemeClr val="accent4"/>
           </a:fillRef>
           <a:effectRef idx="0">
-            <a:schemeClr val="accent6"/>
+            <a:schemeClr val="accent4"/>
           </a:effectRef>
           <a:fontRef idx="minor">
             <a:schemeClr val="tx1"/>
@@ -9492,13 +9490,14 @@
           <p:cNvCxnSpPr>
             <a:cxnSpLocks/>
             <a:stCxn id="5" idx="0"/>
+            <a:endCxn id="2" idx="4"/>
           </p:cNvCxnSpPr>
           <p:nvPr/>
         </p:nvCxnSpPr>
         <p:spPr>
-          <a:xfrm flipH="1" flipV="1">
-            <a:off x="4864100" y="889000"/>
-            <a:ext cx="298450" cy="1574800"/>
+          <a:xfrm flipV="1">
+            <a:off x="4830708" y="942975"/>
+            <a:ext cx="69555" cy="1243571"/>
           </a:xfrm>
           <a:prstGeom prst="line">
             <a:avLst/>
@@ -9534,7 +9533,7 @@
         </p:nvSpPr>
         <p:spPr>
           <a:xfrm>
-            <a:off x="2948629" y="3217216"/>
+            <a:off x="5131835" y="3234496"/>
             <a:ext cx="596900" cy="622300"/>
           </a:xfrm>
           <a:prstGeom prst="ellipse">
@@ -9581,14 +9580,14 @@
           <p:cNvCxnSpPr>
             <a:cxnSpLocks/>
             <a:stCxn id="5" idx="3"/>
-            <a:endCxn id="18" idx="7"/>
+            <a:endCxn id="39" idx="6"/>
           </p:cNvCxnSpPr>
           <p:nvPr/>
         </p:nvCxnSpPr>
         <p:spPr>
           <a:xfrm flipH="1">
-            <a:off x="3458115" y="2994966"/>
-            <a:ext cx="1493399" cy="313384"/>
+            <a:off x="3534766" y="2717712"/>
+            <a:ext cx="1084906" cy="607918"/>
           </a:xfrm>
           <a:prstGeom prst="line">
             <a:avLst/>
@@ -9597,13 +9596,13 @@
         </p:spPr>
         <p:style>
           <a:lnRef idx="1">
-            <a:schemeClr val="accent6"/>
+            <a:schemeClr val="accent4"/>
           </a:lnRef>
           <a:fillRef idx="0">
-            <a:schemeClr val="accent6"/>
+            <a:schemeClr val="accent4"/>
           </a:fillRef>
           <a:effectRef idx="0">
-            <a:schemeClr val="accent6"/>
+            <a:schemeClr val="accent4"/>
           </a:effectRef>
           <a:fontRef idx="minor">
             <a:schemeClr val="tx1"/>
@@ -9677,8 +9676,8 @@
         </p:nvCxnSpPr>
         <p:spPr>
           <a:xfrm flipH="1" flipV="1">
-            <a:off x="6307036" y="358433"/>
-            <a:ext cx="836215" cy="2526701"/>
+            <a:off x="6637236" y="586258"/>
+            <a:ext cx="506015" cy="2298876"/>
           </a:xfrm>
           <a:prstGeom prst="line">
             <a:avLst/>
@@ -10174,7 +10173,7 @@
         </p:nvSpPr>
         <p:spPr>
           <a:xfrm>
-            <a:off x="5797550" y="-172733"/>
+            <a:off x="6127750" y="55092"/>
             <a:ext cx="596900" cy="622300"/>
           </a:xfrm>
           <a:prstGeom prst="ellipse">
@@ -10204,7 +10203,7 @@
             <a:pPr algn="ctr"/>
             <a:r>
               <a:rPr lang="en-SG" dirty="0"/>
-              <a:t>D</a:t>
+              <a:t>E</a:t>
             </a:r>
           </a:p>
         </p:txBody>
@@ -10276,8 +10275,8 @@
         </p:nvCxnSpPr>
         <p:spPr>
           <a:xfrm flipV="1">
-            <a:off x="5436343" y="358433"/>
-            <a:ext cx="448621" cy="273392"/>
+            <a:off x="5436343" y="586258"/>
+            <a:ext cx="778821" cy="45567"/>
           </a:xfrm>
           <a:prstGeom prst="line">
             <a:avLst/>
@@ -10320,8 +10319,8 @@
         </p:nvCxnSpPr>
         <p:spPr>
           <a:xfrm flipV="1">
-            <a:off x="3339124" y="851841"/>
-            <a:ext cx="1182073" cy="2454275"/>
+            <a:off x="3843979" y="851841"/>
+            <a:ext cx="677218" cy="1801775"/>
           </a:xfrm>
           <a:prstGeom prst="line">
             <a:avLst/>
@@ -10427,6 +10426,137 @@
           </a:fillRef>
           <a:effectRef idx="0">
             <a:schemeClr val="accent4"/>
+          </a:effectRef>
+          <a:fontRef idx="minor">
+            <a:schemeClr val="tx1"/>
+          </a:fontRef>
+        </p:style>
+      </p:cxnSp>
+      <p:cxnSp>
+        <p:nvCxnSpPr>
+          <p:cNvPr id="17" name="Straight Connector 16">
+            <a:extLst>
+              <a:ext uri="{FF2B5EF4-FFF2-40B4-BE49-F238E27FC236}">
+                <a16:creationId xmlns:a16="http://schemas.microsoft.com/office/drawing/2014/main" id="{97A65AFE-8A75-BE0C-1DF0-BC43712823F5}"/>
+              </a:ext>
+            </a:extLst>
+          </p:cNvPr>
+          <p:cNvCxnSpPr>
+            <a:cxnSpLocks/>
+            <a:stCxn id="8" idx="3"/>
+            <a:endCxn id="18" idx="6"/>
+          </p:cNvCxnSpPr>
+          <p:nvPr/>
+        </p:nvCxnSpPr>
+        <p:spPr>
+          <a:xfrm flipH="1">
+            <a:off x="5728735" y="1835496"/>
+            <a:ext cx="2260552" cy="1710150"/>
+          </a:xfrm>
+          <a:prstGeom prst="line">
+            <a:avLst/>
+          </a:prstGeom>
+          <a:ln/>
+        </p:spPr>
+        <p:style>
+          <a:lnRef idx="1">
+            <a:schemeClr val="accent6"/>
+          </a:lnRef>
+          <a:fillRef idx="0">
+            <a:schemeClr val="accent6"/>
+          </a:fillRef>
+          <a:effectRef idx="0">
+            <a:schemeClr val="accent6"/>
+          </a:effectRef>
+          <a:fontRef idx="minor">
+            <a:schemeClr val="tx1"/>
+          </a:fontRef>
+        </p:style>
+      </p:cxnSp>
+      <p:sp>
+        <p:nvSpPr>
+          <p:cNvPr id="39" name="Oval 38">
+            <a:extLst>
+              <a:ext uri="{FF2B5EF4-FFF2-40B4-BE49-F238E27FC236}">
+                <a16:creationId xmlns:a16="http://schemas.microsoft.com/office/drawing/2014/main" id="{106AAE00-DA21-A7DE-A0F5-FCE1F9924114}"/>
+              </a:ext>
+            </a:extLst>
+          </p:cNvPr>
+          <p:cNvSpPr/>
+          <p:nvPr/>
+        </p:nvSpPr>
+        <p:spPr>
+          <a:xfrm>
+            <a:off x="2462606" y="3014480"/>
+            <a:ext cx="1072160" cy="622300"/>
+          </a:xfrm>
+          <a:prstGeom prst="ellipse">
+            <a:avLst/>
+          </a:prstGeom>
+        </p:spPr>
+        <p:style>
+          <a:lnRef idx="2">
+            <a:schemeClr val="accent1">
+              <a:shade val="15000"/>
+            </a:schemeClr>
+          </a:lnRef>
+          <a:fillRef idx="1">
+            <a:schemeClr val="accent1"/>
+          </a:fillRef>
+          <a:effectRef idx="0">
+            <a:schemeClr val="accent1"/>
+          </a:effectRef>
+          <a:fontRef idx="minor">
+            <a:schemeClr val="lt1"/>
+          </a:fontRef>
+        </p:style>
+        <p:txBody>
+          <a:bodyPr rtlCol="0" anchor="ctr"/>
+          <a:lstStyle/>
+          <a:p>
+            <a:pPr algn="ctr"/>
+            <a:r>
+              <a:rPr lang="en-SG" dirty="0"/>
+              <a:t>recall</a:t>
+            </a:r>
+          </a:p>
+        </p:txBody>
+      </p:sp>
+      <p:cxnSp>
+        <p:nvCxnSpPr>
+          <p:cNvPr id="42" name="Straight Connector 41">
+            <a:extLst>
+              <a:ext uri="{FF2B5EF4-FFF2-40B4-BE49-F238E27FC236}">
+                <a16:creationId xmlns:a16="http://schemas.microsoft.com/office/drawing/2014/main" id="{5F4A57DF-CF5A-B68A-7BAC-BD103A5C2907}"/>
+              </a:ext>
+            </a:extLst>
+          </p:cNvPr>
+          <p:cNvCxnSpPr>
+            <a:cxnSpLocks/>
+            <a:stCxn id="18" idx="2"/>
+            <a:endCxn id="39" idx="5"/>
+          </p:cNvCxnSpPr>
+          <p:nvPr/>
+        </p:nvCxnSpPr>
+        <p:spPr>
+          <a:xfrm flipH="1">
+            <a:off x="3377752" y="3545646"/>
+            <a:ext cx="1754083" cy="0"/>
+          </a:xfrm>
+          <a:prstGeom prst="line">
+            <a:avLst/>
+          </a:prstGeom>
+          <a:ln/>
+        </p:spPr>
+        <p:style>
+          <a:lnRef idx="1">
+            <a:schemeClr val="accent6"/>
+          </a:lnRef>
+          <a:fillRef idx="0">
+            <a:schemeClr val="accent6"/>
+          </a:fillRef>
+          <a:effectRef idx="0">
+            <a:schemeClr val="accent6"/>
           </a:effectRef>
           <a:fontRef idx="minor">
             <a:schemeClr val="tx1"/>

</xml_diff>